<commit_message>
bundle and tiny update of slides
</commit_message>
<xml_diff>
--- a/talk-slides/rails-girls-heroku-talk.pptx
+++ b/talk-slides/rails-girls-heroku-talk.pptx
@@ -221,7 +221,7 @@
           <a:p>
             <a:fld id="{C6E44D81-2AD3-4E95-9B8C-69D51ED65599}" type="datetimeFigureOut">
               <a:rPr lang="en-US" smtClean="0"/>
-              <a:t>9/18/2017</a:t>
+              <a:t>9/23/2017</a:t>
             </a:fld>
             <a:endParaRPr lang="en-US"/>
           </a:p>
@@ -1737,7 +1737,15 @@
             </a:r>
             <a:r>
               <a:rPr lang="en-US" baseline="0" dirty="0" smtClean="0"/>
-              <a:t> you can create a new app on </a:t>
+              <a:t> you can create a </a:t>
+            </a:r>
+            <a:r>
+              <a:rPr lang="en-US" baseline="0" smtClean="0"/>
+              <a:t>new </a:t>
+            </a:r>
+            <a:r>
+              <a:rPr lang="en-US" baseline="0" smtClean="0"/>
+              <a:t>instance on </a:t>
             </a:r>
             <a:r>
               <a:rPr lang="en-US" baseline="0" dirty="0" err="1" smtClean="0"/>

</xml_diff>